<commit_message>
fixing font (following @u1i's guidelines)
</commit_message>
<xml_diff>
--- a/webinar-2020/img/architecture-api-strategy.pptx
+++ b/webinar-2020/img/architecture-api-strategy.pptx
@@ -104,6 +104,11 @@
       </a:defRPr>
     </a:lvl9pPr>
   </p:defaultTextStyle>
+  <p:extLst>
+    <p:ext uri="{EFAFB233-063F-42B5-8137-9DF3F51BA10A}">
+      <p15:sldGuideLst xmlns:p15="http://schemas.microsoft.com/office/powerpoint/2012/main"/>
+    </p:ext>
+  </p:extLst>
 </p:presentation>
 </file>
 
@@ -3382,6 +3387,7 @@
                     <a:lumMod val="50000"/>
                   </a:schemeClr>
                 </a:solidFill>
+                <a:latin typeface="Avenir Book" panose="02000503020000020003" pitchFamily="2" charset="0"/>
               </a:rPr>
               <a:t>Enterprise Architecture</a:t>
             </a:r>
@@ -3478,7 +3484,7 @@
                     <a:lumOff val="50000"/>
                   </a:schemeClr>
                 </a:solidFill>
-                <a:latin typeface="Futura Medium" panose="020B0602020204020303" pitchFamily="34" charset="-79"/>
+                <a:latin typeface="Avenir Book" panose="02000503020000020003" pitchFamily="2" charset="0"/>
                 <a:cs typeface="Futura Medium" panose="020B0602020204020303" pitchFamily="34" charset="-79"/>
               </a:rPr>
               <a:t>Business Architecture</a:t>
@@ -3574,7 +3580,7 @@
                     <a:lumOff val="50000"/>
                   </a:schemeClr>
                 </a:solidFill>
-                <a:latin typeface="Futura Medium" panose="020B0602020204020303" pitchFamily="34" charset="-79"/>
+                <a:latin typeface="Avenir Book" panose="02000503020000020003" pitchFamily="2" charset="0"/>
                 <a:cs typeface="Futura Medium" panose="020B0602020204020303" pitchFamily="34" charset="-79"/>
               </a:rPr>
               <a:t>IT Architecture</a:t>
@@ -3669,7 +3675,7 @@
                     <a:lumMod val="95000"/>
                   </a:schemeClr>
                 </a:solidFill>
-                <a:latin typeface="Futura Medium" panose="020B0602020204020303" pitchFamily="34" charset="-79"/>
+                <a:latin typeface="Avenir Book" panose="02000503020000020003" pitchFamily="2" charset="0"/>
                 <a:cs typeface="Futura Medium" panose="020B0602020204020303" pitchFamily="34" charset="-79"/>
               </a:rPr>
               <a:t>Digital Transformation (API Strategy)</a:t>

</xml_diff>